<commit_message>
Updated poster, added testing images
Updated poster. Added testing images to test results folder.
</commit_message>
<xml_diff>
--- a/Documentation/Reports and Papers/Bolen_NWBS_2021/Bolen_NWBS_2021.pptx
+++ b/Documentation/Reports and Papers/Bolen_NWBS_2021/Bolen_NWBS_2021.pptx
@@ -417,7 +417,7 @@
           <a:p>
             <a:fld id="{7B21A8F8-12FB-9047-986D-A7D2219D88A2}" type="datetimeFigureOut">
               <a:rPr lang="en-US" smtClean="0"/>
-              <a:t>7/9/2021</a:t>
+              <a:t>7/12/2021</a:t>
             </a:fld>
             <a:endParaRPr lang="en-US"/>
           </a:p>
@@ -580,7 +580,7 @@
           <a:p>
             <a:fld id="{7B21A8F8-12FB-9047-986D-A7D2219D88A2}" type="datetimeFigureOut">
               <a:rPr lang="en-US" smtClean="0"/>
-              <a:t>7/9/2021</a:t>
+              <a:t>7/12/2021</a:t>
             </a:fld>
             <a:endParaRPr lang="en-US"/>
           </a:p>
@@ -753,7 +753,7 @@
           <a:p>
             <a:fld id="{7B21A8F8-12FB-9047-986D-A7D2219D88A2}" type="datetimeFigureOut">
               <a:rPr lang="en-US" smtClean="0"/>
-              <a:t>7/9/2021</a:t>
+              <a:t>7/12/2021</a:t>
             </a:fld>
             <a:endParaRPr lang="en-US"/>
           </a:p>
@@ -916,7 +916,7 @@
           <a:p>
             <a:fld id="{7B21A8F8-12FB-9047-986D-A7D2219D88A2}" type="datetimeFigureOut">
               <a:rPr lang="en-US" smtClean="0"/>
-              <a:t>7/9/2021</a:t>
+              <a:t>7/12/2021</a:t>
             </a:fld>
             <a:endParaRPr lang="en-US"/>
           </a:p>
@@ -1156,7 +1156,7 @@
           <a:p>
             <a:fld id="{7B21A8F8-12FB-9047-986D-A7D2219D88A2}" type="datetimeFigureOut">
               <a:rPr lang="en-US" smtClean="0"/>
-              <a:t>7/9/2021</a:t>
+              <a:t>7/12/2021</a:t>
             </a:fld>
             <a:endParaRPr lang="en-US"/>
           </a:p>
@@ -1436,7 +1436,7 @@
           <a:p>
             <a:fld id="{7B21A8F8-12FB-9047-986D-A7D2219D88A2}" type="datetimeFigureOut">
               <a:rPr lang="en-US" smtClean="0"/>
-              <a:t>7/9/2021</a:t>
+              <a:t>7/12/2021</a:t>
             </a:fld>
             <a:endParaRPr lang="en-US"/>
           </a:p>
@@ -1855,7 +1855,7 @@
           <a:p>
             <a:fld id="{7B21A8F8-12FB-9047-986D-A7D2219D88A2}" type="datetimeFigureOut">
               <a:rPr lang="en-US" smtClean="0"/>
-              <a:t>7/9/2021</a:t>
+              <a:t>7/12/2021</a:t>
             </a:fld>
             <a:endParaRPr lang="en-US"/>
           </a:p>
@@ -1967,7 +1967,7 @@
           <a:p>
             <a:fld id="{7B21A8F8-12FB-9047-986D-A7D2219D88A2}" type="datetimeFigureOut">
               <a:rPr lang="en-US" smtClean="0"/>
-              <a:t>7/9/2021</a:t>
+              <a:t>7/12/2021</a:t>
             </a:fld>
             <a:endParaRPr lang="en-US"/>
           </a:p>
@@ -2057,7 +2057,7 @@
           <a:p>
             <a:fld id="{7B21A8F8-12FB-9047-986D-A7D2219D88A2}" type="datetimeFigureOut">
               <a:rPr lang="en-US" smtClean="0"/>
-              <a:t>7/9/2021</a:t>
+              <a:t>7/12/2021</a:t>
             </a:fld>
             <a:endParaRPr lang="en-US"/>
           </a:p>
@@ -2327,7 +2327,7 @@
           <a:p>
             <a:fld id="{7B21A8F8-12FB-9047-986D-A7D2219D88A2}" type="datetimeFigureOut">
               <a:rPr lang="en-US" smtClean="0"/>
-              <a:t>7/9/2021</a:t>
+              <a:t>7/12/2021</a:t>
             </a:fld>
             <a:endParaRPr lang="en-US"/>
           </a:p>
@@ -2574,7 +2574,7 @@
           <a:p>
             <a:fld id="{7B21A8F8-12FB-9047-986D-A7D2219D88A2}" type="datetimeFigureOut">
               <a:rPr lang="en-US" smtClean="0"/>
-              <a:t>7/9/2021</a:t>
+              <a:t>7/12/2021</a:t>
             </a:fld>
             <a:endParaRPr lang="en-US"/>
           </a:p>
@@ -2780,7 +2780,7 @@
           <a:p>
             <a:fld id="{7B21A8F8-12FB-9047-986D-A7D2219D88A2}" type="datetimeFigureOut">
               <a:rPr lang="en-US" smtClean="0"/>
-              <a:t>7/9/2021</a:t>
+              <a:t>7/12/2021</a:t>
             </a:fld>
             <a:endParaRPr lang="en-US"/>
           </a:p>
@@ -3678,7 +3678,7 @@
           </p:cNvPicPr>
           <p:nvPr/>
         </p:nvPicPr>
-        <p:blipFill>
+        <p:blipFill rotWithShape="1">
           <a:blip r:embed="rId3">
             <a:extLst>
               <a:ext uri="{28A0092B-C50C-407E-A947-70E740481C1C}">
@@ -3686,15 +3686,13 @@
               </a:ext>
             </a:extLst>
           </a:blip>
-          <a:srcRect/>
-          <a:stretch>
-            <a:fillRect/>
-          </a:stretch>
+          <a:srcRect l="3105" b="23894"/>
+          <a:stretch/>
         </p:blipFill>
         <p:spPr bwMode="auto">
           <a:xfrm>
-            <a:off x="1512818" y="1942120"/>
-            <a:ext cx="12055724" cy="3674739"/>
+            <a:off x="1839880" y="1041351"/>
+            <a:ext cx="11681400" cy="2796701"/>
           </a:xfrm>
           <a:prstGeom prst="rect">
             <a:avLst/>
@@ -4076,7 +4074,7 @@
         </p:blipFill>
         <p:spPr bwMode="auto">
           <a:xfrm>
-            <a:off x="24245052" y="13604738"/>
+            <a:off x="24392537" y="13604738"/>
             <a:ext cx="11610798" cy="9361990"/>
           </a:xfrm>
           <a:prstGeom prst="rect">
@@ -4675,6 +4673,42 @@
           </a:p>
         </p:txBody>
       </p:sp>
+      <p:pic>
+        <p:nvPicPr>
+          <p:cNvPr id="10" name="Picture 9" descr="A picture containing text&#10;&#10;Description automatically generated">
+            <a:extLst>
+              <a:ext uri="{FF2B5EF4-FFF2-40B4-BE49-F238E27FC236}">
+                <a16:creationId xmlns:a16="http://schemas.microsoft.com/office/drawing/2014/main" id="{5FD4630B-792E-430D-A152-6A5891E482A3}"/>
+              </a:ext>
+            </a:extLst>
+          </p:cNvPr>
+          <p:cNvPicPr>
+            <a:picLocks noChangeAspect="1"/>
+          </p:cNvPicPr>
+          <p:nvPr/>
+        </p:nvPicPr>
+        <p:blipFill>
+          <a:blip r:embed="rId7">
+            <a:extLst>
+              <a:ext uri="{28A0092B-C50C-407E-A947-70E740481C1C}">
+                <a14:useLocalDpi xmlns:a14="http://schemas.microsoft.com/office/drawing/2010/main" val="0"/>
+              </a:ext>
+            </a:extLst>
+          </a:blip>
+          <a:stretch>
+            <a:fillRect/>
+          </a:stretch>
+        </p:blipFill>
+        <p:spPr>
+          <a:xfrm>
+            <a:off x="1764101" y="3779707"/>
+            <a:ext cx="11530020" cy="2306005"/>
+          </a:xfrm>
+          <a:prstGeom prst="rect">
+            <a:avLst/>
+          </a:prstGeom>
+        </p:spPr>
+      </p:pic>
     </p:spTree>
   </p:cSld>
   <p:clrMapOvr>

</xml_diff>